<commit_message>
updated umoxe rad and u aimd papers
</commit_message>
<xml_diff>
--- a/u_mddft_paper/aimd3/pics.pptx
+++ b/u_mddft_paper/aimd3/pics.pptx
@@ -6,6 +6,7 @@
   </p:sldMasterIdLst>
   <p:sldIdLst>
     <p:sldId id="256" r:id="rId2"/>
+    <p:sldId id="257" r:id="rId3"/>
   </p:sldIdLst>
   <p:sldSz cx="12192000" cy="6858000"/>
   <p:notesSz cx="6858000" cy="9144000"/>
@@ -3364,6 +3365,96 @@
 </p:sld>
 </file>
 
+<file path=ppt/slides/slide2.xml><?xml version="1.0" encoding="utf-8"?>
+<p:sld xmlns:a="http://schemas.openxmlformats.org/drawingml/2006/main" xmlns:r="http://schemas.openxmlformats.org/officeDocument/2006/relationships" xmlns:p="http://schemas.openxmlformats.org/presentationml/2006/main">
+  <p:cSld>
+    <p:spTree>
+      <p:nvGrpSpPr>
+        <p:cNvPr id="1" name=""/>
+        <p:cNvGrpSpPr/>
+        <p:nvPr/>
+      </p:nvGrpSpPr>
+      <p:grpSpPr>
+        <a:xfrm>
+          <a:off x="0" y="0"/>
+          <a:ext cx="0" cy="0"/>
+          <a:chOff x="0" y="0"/>
+          <a:chExt cx="0" cy="0"/>
+        </a:xfrm>
+      </p:grpSpPr>
+      <p:pic>
+        <p:nvPicPr>
+          <p:cNvPr id="4" name="Picture 3">
+            <a:extLst>
+              <a:ext uri="{FF2B5EF4-FFF2-40B4-BE49-F238E27FC236}">
+                <a16:creationId xmlns:a16="http://schemas.microsoft.com/office/drawing/2014/main" id="{301FE82D-64BF-6847-805D-72B40B08857B}"/>
+              </a:ext>
+            </a:extLst>
+          </p:cNvPr>
+          <p:cNvPicPr>
+            <a:picLocks noChangeAspect="1"/>
+          </p:cNvPicPr>
+          <p:nvPr/>
+        </p:nvPicPr>
+        <p:blipFill>
+          <a:blip r:embed="rId2"/>
+          <a:stretch>
+            <a:fillRect/>
+          </a:stretch>
+        </p:blipFill>
+        <p:spPr>
+          <a:xfrm>
+            <a:off x="1470212" y="1286435"/>
+            <a:ext cx="4572000" cy="3657600"/>
+          </a:xfrm>
+          <a:prstGeom prst="rect">
+            <a:avLst/>
+          </a:prstGeom>
+        </p:spPr>
+      </p:pic>
+      <p:pic>
+        <p:nvPicPr>
+          <p:cNvPr id="6" name="Picture 5">
+            <a:extLst>
+              <a:ext uri="{FF2B5EF4-FFF2-40B4-BE49-F238E27FC236}">
+                <a16:creationId xmlns:a16="http://schemas.microsoft.com/office/drawing/2014/main" id="{E42A07D5-4839-984B-AB79-0A665CE8090A}"/>
+              </a:ext>
+            </a:extLst>
+          </p:cNvPr>
+          <p:cNvPicPr>
+            <a:picLocks noChangeAspect="1"/>
+          </p:cNvPicPr>
+          <p:nvPr/>
+        </p:nvPicPr>
+        <p:blipFill>
+          <a:blip r:embed="rId3"/>
+          <a:stretch>
+            <a:fillRect/>
+          </a:stretch>
+        </p:blipFill>
+        <p:spPr>
+          <a:xfrm>
+            <a:off x="6042212" y="1286435"/>
+            <a:ext cx="4572000" cy="3657600"/>
+          </a:xfrm>
+          <a:prstGeom prst="rect">
+            <a:avLst/>
+          </a:prstGeom>
+        </p:spPr>
+      </p:pic>
+    </p:spTree>
+    <p:extLst>
+      <p:ext uri="{BB962C8B-B14F-4D97-AF65-F5344CB8AC3E}">
+        <p14:creationId xmlns:p14="http://schemas.microsoft.com/office/powerpoint/2010/main" val="3427439660"/>
+      </p:ext>
+    </p:extLst>
+  </p:cSld>
+  <p:clrMapOvr>
+    <a:masterClrMapping/>
+  </p:clrMapOvr>
+</p:sld>
+</file>
+
 <file path=ppt/theme/theme1.xml><?xml version="1.0" encoding="utf-8"?>
 <a:theme xmlns:a="http://schemas.openxmlformats.org/drawingml/2006/main" name="Office Theme">
   <a:themeElements>

</xml_diff>

<commit_message>
moved umoxe bubble to complete, updated md dft
</commit_message>
<xml_diff>
--- a/u_mddft_paper/aimd3/pics.pptx
+++ b/u_mddft_paper/aimd3/pics.pptx
@@ -7,6 +7,7 @@
   <p:sldIdLst>
     <p:sldId id="256" r:id="rId2"/>
     <p:sldId id="257" r:id="rId3"/>
+    <p:sldId id="258" r:id="rId4"/>
   </p:sldIdLst>
   <p:sldSz cx="12192000" cy="6858000"/>
   <p:notesSz cx="6858000" cy="9144000"/>
@@ -105,6 +106,11 @@
       </a:defRPr>
     </a:lvl9pPr>
   </p:defaultTextStyle>
+  <p:extLst>
+    <p:ext uri="{EFAFB233-063F-42B5-8137-9DF3F51BA10A}">
+      <p15:sldGuideLst xmlns:p15="http://schemas.microsoft.com/office/powerpoint/2012/main"/>
+    </p:ext>
+  </p:extLst>
 </p:presentation>
 </file>
 
@@ -255,7 +261,7 @@
           <a:p>
             <a:fld id="{581BEB5D-54B5-A443-AD8C-1DAFF4CDC2D2}" type="datetimeFigureOut">
               <a:rPr lang="en-US" smtClean="0"/>
-              <a:t>1/7/20</a:t>
+              <a:t>1/15/20</a:t>
             </a:fld>
             <a:endParaRPr lang="en-US"/>
           </a:p>
@@ -453,7 +459,7 @@
           <a:p>
             <a:fld id="{581BEB5D-54B5-A443-AD8C-1DAFF4CDC2D2}" type="datetimeFigureOut">
               <a:rPr lang="en-US" smtClean="0"/>
-              <a:t>1/7/20</a:t>
+              <a:t>1/15/20</a:t>
             </a:fld>
             <a:endParaRPr lang="en-US"/>
           </a:p>
@@ -661,7 +667,7 @@
           <a:p>
             <a:fld id="{581BEB5D-54B5-A443-AD8C-1DAFF4CDC2D2}" type="datetimeFigureOut">
               <a:rPr lang="en-US" smtClean="0"/>
-              <a:t>1/7/20</a:t>
+              <a:t>1/15/20</a:t>
             </a:fld>
             <a:endParaRPr lang="en-US"/>
           </a:p>
@@ -859,7 +865,7 @@
           <a:p>
             <a:fld id="{581BEB5D-54B5-A443-AD8C-1DAFF4CDC2D2}" type="datetimeFigureOut">
               <a:rPr lang="en-US" smtClean="0"/>
-              <a:t>1/7/20</a:t>
+              <a:t>1/15/20</a:t>
             </a:fld>
             <a:endParaRPr lang="en-US"/>
           </a:p>
@@ -1134,7 +1140,7 @@
           <a:p>
             <a:fld id="{581BEB5D-54B5-A443-AD8C-1DAFF4CDC2D2}" type="datetimeFigureOut">
               <a:rPr lang="en-US" smtClean="0"/>
-              <a:t>1/7/20</a:t>
+              <a:t>1/15/20</a:t>
             </a:fld>
             <a:endParaRPr lang="en-US"/>
           </a:p>
@@ -1399,7 +1405,7 @@
           <a:p>
             <a:fld id="{581BEB5D-54B5-A443-AD8C-1DAFF4CDC2D2}" type="datetimeFigureOut">
               <a:rPr lang="en-US" smtClean="0"/>
-              <a:t>1/7/20</a:t>
+              <a:t>1/15/20</a:t>
             </a:fld>
             <a:endParaRPr lang="en-US"/>
           </a:p>
@@ -1811,7 +1817,7 @@
           <a:p>
             <a:fld id="{581BEB5D-54B5-A443-AD8C-1DAFF4CDC2D2}" type="datetimeFigureOut">
               <a:rPr lang="en-US" smtClean="0"/>
-              <a:t>1/7/20</a:t>
+              <a:t>1/15/20</a:t>
             </a:fld>
             <a:endParaRPr lang="en-US"/>
           </a:p>
@@ -1952,7 +1958,7 @@
           <a:p>
             <a:fld id="{581BEB5D-54B5-A443-AD8C-1DAFF4CDC2D2}" type="datetimeFigureOut">
               <a:rPr lang="en-US" smtClean="0"/>
-              <a:t>1/7/20</a:t>
+              <a:t>1/15/20</a:t>
             </a:fld>
             <a:endParaRPr lang="en-US"/>
           </a:p>
@@ -2065,7 +2071,7 @@
           <a:p>
             <a:fld id="{581BEB5D-54B5-A443-AD8C-1DAFF4CDC2D2}" type="datetimeFigureOut">
               <a:rPr lang="en-US" smtClean="0"/>
-              <a:t>1/7/20</a:t>
+              <a:t>1/15/20</a:t>
             </a:fld>
             <a:endParaRPr lang="en-US"/>
           </a:p>
@@ -2376,7 +2382,7 @@
           <a:p>
             <a:fld id="{581BEB5D-54B5-A443-AD8C-1DAFF4CDC2D2}" type="datetimeFigureOut">
               <a:rPr lang="en-US" smtClean="0"/>
-              <a:t>1/7/20</a:t>
+              <a:t>1/15/20</a:t>
             </a:fld>
             <a:endParaRPr lang="en-US"/>
           </a:p>
@@ -2664,7 +2670,7 @@
           <a:p>
             <a:fld id="{581BEB5D-54B5-A443-AD8C-1DAFF4CDC2D2}" type="datetimeFigureOut">
               <a:rPr lang="en-US" smtClean="0"/>
-              <a:t>1/7/20</a:t>
+              <a:t>1/15/20</a:t>
             </a:fld>
             <a:endParaRPr lang="en-US"/>
           </a:p>
@@ -2905,7 +2911,7 @@
           <a:p>
             <a:fld id="{581BEB5D-54B5-A443-AD8C-1DAFF4CDC2D2}" type="datetimeFigureOut">
               <a:rPr lang="en-US" smtClean="0"/>
-              <a:t>1/7/20</a:t>
+              <a:t>1/15/20</a:t>
             </a:fld>
             <a:endParaRPr lang="en-US"/>
           </a:p>
@@ -3455,6 +3461,66 @@
 </p:sld>
 </file>
 
+<file path=ppt/slides/slide3.xml><?xml version="1.0" encoding="utf-8"?>
+<p:sld xmlns:a="http://schemas.openxmlformats.org/drawingml/2006/main" xmlns:r="http://schemas.openxmlformats.org/officeDocument/2006/relationships" xmlns:p="http://schemas.openxmlformats.org/presentationml/2006/main">
+  <p:cSld>
+    <p:spTree>
+      <p:nvGrpSpPr>
+        <p:cNvPr id="1" name=""/>
+        <p:cNvGrpSpPr/>
+        <p:nvPr/>
+      </p:nvGrpSpPr>
+      <p:grpSpPr>
+        <a:xfrm>
+          <a:off x="0" y="0"/>
+          <a:ext cx="0" cy="0"/>
+          <a:chOff x="0" y="0"/>
+          <a:chExt cx="0" cy="0"/>
+        </a:xfrm>
+      </p:grpSpPr>
+      <p:pic>
+        <p:nvPicPr>
+          <p:cNvPr id="4" name="Picture 3">
+            <a:extLst>
+              <a:ext uri="{FF2B5EF4-FFF2-40B4-BE49-F238E27FC236}">
+                <a16:creationId xmlns:a16="http://schemas.microsoft.com/office/drawing/2014/main" id="{BA36D343-83C6-E14A-97C7-999B1DFE87A9}"/>
+              </a:ext>
+            </a:extLst>
+          </p:cNvPr>
+          <p:cNvPicPr>
+            <a:picLocks noChangeAspect="1"/>
+          </p:cNvPicPr>
+          <p:nvPr/>
+        </p:nvPicPr>
+        <p:blipFill>
+          <a:blip r:embed="rId2"/>
+          <a:stretch>
+            <a:fillRect/>
+          </a:stretch>
+        </p:blipFill>
+        <p:spPr>
+          <a:xfrm>
+            <a:off x="2644590" y="797859"/>
+            <a:ext cx="6938682" cy="5204012"/>
+          </a:xfrm>
+          <a:prstGeom prst="rect">
+            <a:avLst/>
+          </a:prstGeom>
+        </p:spPr>
+      </p:pic>
+    </p:spTree>
+    <p:extLst>
+      <p:ext uri="{BB962C8B-B14F-4D97-AF65-F5344CB8AC3E}">
+        <p14:creationId xmlns:p14="http://schemas.microsoft.com/office/powerpoint/2010/main" val="2282103331"/>
+      </p:ext>
+    </p:extLst>
+  </p:cSld>
+  <p:clrMapOvr>
+    <a:masterClrMapping/>
+  </p:clrMapOvr>
+</p:sld>
+</file>
+
 <file path=ppt/theme/theme1.xml><?xml version="1.0" encoding="utf-8"?>
 <a:theme xmlns:a="http://schemas.openxmlformats.org/drawingml/2006/main" name="Office Theme">
   <a:themeElements>

</xml_diff>